<commit_message>
Fix typo in presentation title
</commit_message>
<xml_diff>
--- a/presentation/prototype 1.pptx
+++ b/presentation/prototype 1.pptx
@@ -3601,7 +3601,7 @@
                   <a:schemeClr val="tx1"/>
                 </a:solidFill>
               </a:rPr>
-              <a:t>Text-Based motion detection</a:t>
+              <a:t>Text-Based emotion detection</a:t>
             </a:r>
           </a:p>
         </p:txBody>
@@ -3640,16 +3640,12 @@
               </a:lnSpc>
             </a:pPr>
             <a:r>
-              <a:rPr lang="en-US" sz="1600" dirty="0"/>
-              <a:t>Datasets &amp; </a:t>
-            </a:r>
-            <a:r>
               <a:rPr lang="en-US" sz="1600" b="0" i="0" u="none" strike="noStrike" dirty="0">
                 <a:solidFill>
                   <a:schemeClr val="tx1"/>
                 </a:solidFill>
               </a:rPr>
-              <a:t>current advances </a:t>
+              <a:t>current advances</a:t>
             </a:r>
             <a:endParaRPr lang="en-US" sz="1600" dirty="0"/>
           </a:p>
@@ -9323,12 +9319,12 @@
 </file>
 
 <file path=customXml/item1.xml><?xml version="1.0" encoding="utf-8"?>
-<?mso-contentType ?>
-<FormTemplates xmlns="http://schemas.microsoft.com/sharepoint/v3/contenttype/forms">
-  <Display>DocumentLibraryForm</Display>
-  <Edit>DocumentLibraryForm</Edit>
-  <New>DocumentLibraryForm</New>
-</FormTemplates>
+<p:properties xmlns:p="http://schemas.microsoft.com/office/2006/metadata/properties" xmlns:xsi="http://www.w3.org/2001/XMLSchema-instance" xmlns:pc="http://schemas.microsoft.com/office/infopath/2007/PartnerControls">
+  <documentManagement>
+    <Status xmlns="71af3243-3dd4-4a8d-8c0d-dd76da1f02a5">Not started</Status>
+    <MediaServiceKeyPoints xmlns="71af3243-3dd4-4a8d-8c0d-dd76da1f02a5" xsi:nil="true"/>
+  </documentManagement>
+</p:properties>
 </file>
 
 <file path=customXml/item2.xml><?xml version="1.0" encoding="utf-8"?>
@@ -9553,18 +9549,20 @@
 </file>
 
 <file path=customXml/item3.xml><?xml version="1.0" encoding="utf-8"?>
-<p:properties xmlns:p="http://schemas.microsoft.com/office/2006/metadata/properties" xmlns:xsi="http://www.w3.org/2001/XMLSchema-instance" xmlns:pc="http://schemas.microsoft.com/office/infopath/2007/PartnerControls">
-  <documentManagement>
-    <Status xmlns="71af3243-3dd4-4a8d-8c0d-dd76da1f02a5">Not started</Status>
-    <MediaServiceKeyPoints xmlns="71af3243-3dd4-4a8d-8c0d-dd76da1f02a5" xsi:nil="true"/>
-  </documentManagement>
-</p:properties>
+<?mso-contentType ?>
+<FormTemplates xmlns="http://schemas.microsoft.com/sharepoint/v3/contenttype/forms">
+  <Display>DocumentLibraryForm</Display>
+  <Edit>DocumentLibraryForm</Edit>
+  <New>DocumentLibraryForm</New>
+</FormTemplates>
 </file>
 
 <file path=customXml/itemProps1.xml><?xml version="1.0" encoding="utf-8"?>
-<ds:datastoreItem xmlns:ds="http://schemas.openxmlformats.org/officeDocument/2006/customXml" ds:itemID="{AA3F7EDC-E5B4-4BBC-9D2A-CBE6D46C37AD}">
+<ds:datastoreItem xmlns:ds="http://schemas.openxmlformats.org/officeDocument/2006/customXml" ds:itemID="{A03EEFF0-FB57-4CB4-8BFC-DF397689E2ED}">
   <ds:schemaRefs>
-    <ds:schemaRef ds:uri="http://schemas.microsoft.com/sharepoint/v3/contenttype/forms"/>
+    <ds:schemaRef ds:uri="http://schemas.microsoft.com/office/2006/metadata/properties"/>
+    <ds:schemaRef ds:uri="http://schemas.microsoft.com/office/infopath/2007/PartnerControls"/>
+    <ds:schemaRef ds:uri="71af3243-3dd4-4a8d-8c0d-dd76da1f02a5"/>
   </ds:schemaRefs>
 </ds:datastoreItem>
 </file>
@@ -9589,11 +9587,9 @@
 </file>
 
 <file path=customXml/itemProps3.xml><?xml version="1.0" encoding="utf-8"?>
-<ds:datastoreItem xmlns:ds="http://schemas.openxmlformats.org/officeDocument/2006/customXml" ds:itemID="{A03EEFF0-FB57-4CB4-8BFC-DF397689E2ED}">
+<ds:datastoreItem xmlns:ds="http://schemas.openxmlformats.org/officeDocument/2006/customXml" ds:itemID="{AA3F7EDC-E5B4-4BBC-9D2A-CBE6D46C37AD}">
   <ds:schemaRefs>
-    <ds:schemaRef ds:uri="http://schemas.microsoft.com/office/2006/metadata/properties"/>
-    <ds:schemaRef ds:uri="http://schemas.microsoft.com/office/infopath/2007/PartnerControls"/>
-    <ds:schemaRef ds:uri="71af3243-3dd4-4a8d-8c0d-dd76da1f02a5"/>
+    <ds:schemaRef ds:uri="http://schemas.microsoft.com/sharepoint/v3/contenttype/forms"/>
   </ds:schemaRefs>
 </ds:datastoreItem>
 </file>
</xml_diff>